<commit_message>
prepare migration to new repository
</commit_message>
<xml_diff>
--- a/assets/powerpoint/FINAL.pptx
+++ b/assets/powerpoint/FINAL.pptx
@@ -217,7 +217,7 @@
           <a:p>
             <a:fld id="{2200A576-25EE-AE48-B45D-2B315AF35991}" type="datetimeFigureOut">
               <a:rPr lang="fr-FR" smtClean="0"/>
-              <a:t>19/08/2019</a:t>
+              <a:t>20/08/2019</a:t>
             </a:fld>
             <a:endParaRPr lang="fr-FR"/>
           </a:p>
@@ -1190,106 +1190,48 @@
           <a:lstStyle/>
           <a:p>
             <a:r>
-              <a:rPr lang="fr-FR" b="1" dirty="0"/>
-              <a:t>Il lance des container, ex java et python</a:t>
-            </a:r>
-          </a:p>
-          <a:p>
-            <a:r>
-              <a:rPr lang="fr-FR" b="1" dirty="0"/>
-              <a:t>C’est quoi ? </a:t>
-            </a:r>
-          </a:p>
-          <a:p>
-            <a:r>
               <a:rPr lang="fr-FR" b="0" dirty="0"/>
-              <a:t>C’est un serveur Javalin, ayant pour but de recevoir du code, et d’en retourner le résultat.</a:t>
-            </a:r>
-          </a:p>
-          <a:p>
+              <a:t>Docker : </a:t>
+            </a:r>
+          </a:p>
+          <a:p>
+            <a:r>
+              <a:rPr lang="fr-FR" b="0" dirty="0"/>
+              <a:t>Container -&gt; un moyen de simuler un environnement linux cloisonne sur la machine hôte .</a:t>
+            </a:r>
+          </a:p>
+          <a:p>
+            <a:r>
+              <a:rPr lang="fr-FR" b="0" dirty="0"/>
+              <a:t>Ça fait : ram mémoire et </a:t>
+            </a:r>
+            <a:r>
+              <a:rPr lang="fr-FR" b="0" dirty="0" err="1"/>
+              <a:t>sys</a:t>
+            </a:r>
+            <a:r>
+              <a:rPr lang="fr-FR" b="0" dirty="0"/>
+              <a:t> fichier par exemple,  est basé sur </a:t>
+            </a:r>
+            <a:r>
+              <a:rPr lang="fr-FR" b="0" dirty="0" err="1"/>
+              <a:t>lxc</a:t>
+            </a:r>
             <a:endParaRPr lang="fr-FR" b="0" dirty="0"/>
           </a:p>
           <a:p>
+            <a:endParaRPr lang="fr-FR" b="0" dirty="0"/>
+          </a:p>
+          <a:p>
             <a:r>
               <a:rPr lang="fr-FR" b="0" dirty="0"/>
-              <a:t>C’est la ou va être compiler, </a:t>
+              <a:t>Le but c’est de pouvoir faire tourner des environnement linux cloisonné mais partageant juste le même </a:t>
             </a:r>
             <a:r>
               <a:rPr lang="fr-FR" b="0" dirty="0" err="1"/>
-              <a:t>interpreter</a:t>
-            </a:r>
-            <a:r>
-              <a:rPr lang="fr-FR" b="0" dirty="0"/>
-              <a:t> le code de l’utilisateur et de la batterie tests.</a:t>
-            </a:r>
-          </a:p>
-          <a:p>
+              <a:t>noyeaux</a:t>
+            </a:r>
             <a:endParaRPr lang="fr-FR" b="0" dirty="0"/>
-          </a:p>
-          <a:p>
-            <a:r>
-              <a:rPr lang="fr-FR" b="1" dirty="0"/>
-              <a:t>Pourquoi ? </a:t>
-            </a:r>
-          </a:p>
-          <a:p>
-            <a:r>
-              <a:rPr lang="fr-FR" b="0" dirty="0"/>
-              <a:t>.Pour que l’utilisateur puisse coder via le site web, sans n’installer de langage</a:t>
-            </a:r>
-          </a:p>
-          <a:p>
-            <a:r>
-              <a:rPr lang="fr-FR" b="0" dirty="0"/>
-              <a:t>.Mon service = aucune dépendances avec des services tel que</a:t>
-            </a:r>
-          </a:p>
-          <a:p>
-            <a:endParaRPr lang="fr-FR" b="0" dirty="0"/>
-          </a:p>
-          <a:p>
-            <a:r>
-              <a:rPr lang="fr-FR" b="1" dirty="0"/>
-              <a:t>Problème : Faille en faisant </a:t>
-            </a:r>
-            <a:r>
-              <a:rPr lang="fr-FR" b="1" dirty="0" err="1"/>
-              <a:t>executer</a:t>
-            </a:r>
-            <a:r>
-              <a:rPr lang="fr-FR" b="1" dirty="0"/>
-              <a:t> le code de l’utilisateur sur la machine hôte</a:t>
-            </a:r>
-          </a:p>
-          <a:p>
-            <a:r>
-              <a:rPr lang="fr-FR" b="0" dirty="0"/>
-              <a:t>Solution : Docker</a:t>
-            </a:r>
-          </a:p>
-          <a:p>
-            <a:endParaRPr lang="fr-FR" b="0" dirty="0"/>
-          </a:p>
-          <a:p>
-            <a:r>
-              <a:rPr lang="fr-FR" b="1" dirty="0"/>
-              <a:t>Comment ça marche ? </a:t>
-            </a:r>
-          </a:p>
-          <a:p>
-            <a:r>
-              <a:rPr lang="fr-FR" b="0" dirty="0"/>
-              <a:t>Schéma</a:t>
-            </a:r>
-          </a:p>
-          <a:p>
-            <a:endParaRPr lang="fr-FR" b="0" dirty="0"/>
-          </a:p>
-          <a:p>
-            <a:r>
-              <a:rPr lang="fr-FR" b="0" dirty="0"/>
-              <a:t>Pour l’utilisateur, le workflow est totalement transparent, et c’est le but !</a:t>
-            </a:r>
           </a:p>
         </p:txBody>
       </p:sp>
@@ -3164,6 +3106,93 @@
     <p:extLst>
       <p:ext uri="{BB962C8B-B14F-4D97-AF65-F5344CB8AC3E}">
         <p14:creationId xmlns:p14="http://schemas.microsoft.com/office/powerpoint/2010/main" val="696645220"/>
+      </p:ext>
+    </p:extLst>
+  </p:cSld>
+  <p:clrMapOvr>
+    <a:masterClrMapping/>
+  </p:clrMapOvr>
+</p:notes>
+</file>
+
+<file path=ppt/notesSlides/notesSlide20.xml><?xml version="1.0" encoding="utf-8"?>
+<p:notes xmlns:a="http://schemas.openxmlformats.org/drawingml/2006/main" xmlns:r="http://schemas.openxmlformats.org/officeDocument/2006/relationships" xmlns:p="http://schemas.openxmlformats.org/presentationml/2006/main">
+  <p:cSld>
+    <p:spTree>
+      <p:nvGrpSpPr>
+        <p:cNvPr id="1" name=""/>
+        <p:cNvGrpSpPr/>
+        <p:nvPr/>
+      </p:nvGrpSpPr>
+      <p:grpSpPr>
+        <a:xfrm>
+          <a:off x="0" y="0"/>
+          <a:ext cx="0" cy="0"/>
+          <a:chOff x="0" y="0"/>
+          <a:chExt cx="0" cy="0"/>
+        </a:xfrm>
+      </p:grpSpPr>
+      <p:sp>
+        <p:nvSpPr>
+          <p:cNvPr id="2" name="Espace réservé de l'image des diapositives 1"/>
+          <p:cNvSpPr>
+            <a:spLocks noGrp="1" noRot="1" noChangeAspect="1"/>
+          </p:cNvSpPr>
+          <p:nvPr>
+            <p:ph type="sldImg"/>
+          </p:nvPr>
+        </p:nvSpPr>
+        <p:spPr/>
+      </p:sp>
+      <p:sp>
+        <p:nvSpPr>
+          <p:cNvPr id="3" name="Espace réservé des notes 2"/>
+          <p:cNvSpPr>
+            <a:spLocks noGrp="1"/>
+          </p:cNvSpPr>
+          <p:nvPr>
+            <p:ph type="body" idx="1"/>
+          </p:nvPr>
+        </p:nvSpPr>
+        <p:spPr/>
+        <p:txBody>
+          <a:bodyPr/>
+          <a:lstStyle/>
+          <a:p>
+            <a:r>
+              <a:rPr lang="fr-FR" dirty="0"/>
+              <a:t>Un container ça virtualise : mémoire, ram, système de fichier, mais pas l’os, </a:t>
+            </a:r>
+          </a:p>
+        </p:txBody>
+      </p:sp>
+      <p:sp>
+        <p:nvSpPr>
+          <p:cNvPr id="4" name="Espace réservé du numéro de diapositive 3"/>
+          <p:cNvSpPr>
+            <a:spLocks noGrp="1"/>
+          </p:cNvSpPr>
+          <p:nvPr>
+            <p:ph type="sldNum" sz="quarter" idx="5"/>
+          </p:nvPr>
+        </p:nvSpPr>
+        <p:spPr/>
+        <p:txBody>
+          <a:bodyPr/>
+          <a:lstStyle/>
+          <a:p>
+            <a:fld id="{D94C63D7-C850-CC42-9A80-7E91D563A985}" type="slidenum">
+              <a:rPr lang="fr-FR" smtClean="0"/>
+              <a:t>21</a:t>
+            </a:fld>
+            <a:endParaRPr lang="fr-FR"/>
+          </a:p>
+        </p:txBody>
+      </p:sp>
+    </p:spTree>
+    <p:extLst>
+      <p:ext uri="{BB962C8B-B14F-4D97-AF65-F5344CB8AC3E}">
+        <p14:creationId xmlns:p14="http://schemas.microsoft.com/office/powerpoint/2010/main" val="2974935416"/>
       </p:ext>
     </p:extLst>
   </p:cSld>
@@ -4462,7 +4491,7 @@
           <a:p>
             <a:fld id="{AC59DA50-D32E-8549-9876-F5DEDDEC495C}" type="datetime1">
               <a:rPr lang="fr-CH" smtClean="0"/>
-              <a:t>19.08.19</a:t>
+              <a:t>20.08.19</a:t>
             </a:fld>
             <a:endParaRPr lang="fr-FR"/>
           </a:p>
@@ -4663,7 +4692,7 @@
           <a:p>
             <a:fld id="{940922D3-939D-A34F-80C3-15CB182DDB5C}" type="datetime1">
               <a:rPr lang="fr-CH" smtClean="0"/>
-              <a:t>19.08.19</a:t>
+              <a:t>20.08.19</a:t>
             </a:fld>
             <a:endParaRPr lang="fr-FR"/>
           </a:p>
@@ -4874,7 +4903,7 @@
           <a:p>
             <a:fld id="{6BE97217-4C2D-884E-B62E-B4B7355C8240}" type="datetime1">
               <a:rPr lang="fr-CH" smtClean="0"/>
-              <a:t>19.08.19</a:t>
+              <a:t>20.08.19</a:t>
             </a:fld>
             <a:endParaRPr lang="fr-FR"/>
           </a:p>
@@ -5125,7 +5154,7 @@
           <a:p>
             <a:fld id="{52BDF197-18C7-6B4C-A7F9-9E4D2E838DAD}" type="datetime1">
               <a:rPr lang="fr-CH" smtClean="0"/>
-              <a:t>19.08.19</a:t>
+              <a:t>20.08.19</a:t>
             </a:fld>
             <a:endParaRPr lang="fr-FR"/>
           </a:p>
@@ -5412,7 +5441,7 @@
           <a:p>
             <a:fld id="{DEC42D19-7022-A84A-AF3C-2C293BC2FC36}" type="datetime1">
               <a:rPr lang="fr-CH" smtClean="0"/>
-              <a:t>19.08.19</a:t>
+              <a:t>20.08.19</a:t>
             </a:fld>
             <a:endParaRPr lang="fr-FR"/>
           </a:p>
@@ -5680,7 +5709,7 @@
           <a:p>
             <a:fld id="{21B1EF0B-3047-9C4E-BD94-D1D1DF6F2D67}" type="datetime1">
               <a:rPr lang="fr-CH" smtClean="0"/>
-              <a:t>19.08.19</a:t>
+              <a:t>20.08.19</a:t>
             </a:fld>
             <a:endParaRPr lang="fr-FR"/>
           </a:p>
@@ -6095,7 +6124,7 @@
           <a:p>
             <a:fld id="{C0E6EA8F-74AD-8847-87E1-B79722BCEC20}" type="datetime1">
               <a:rPr lang="fr-CH" smtClean="0"/>
-              <a:t>19.08.19</a:t>
+              <a:t>20.08.19</a:t>
             </a:fld>
             <a:endParaRPr lang="fr-FR"/>
           </a:p>
@@ -6239,7 +6268,7 @@
           <a:p>
             <a:fld id="{A7FC9D05-9153-584D-9C4C-C54639C575D5}" type="datetime1">
               <a:rPr lang="fr-CH" smtClean="0"/>
-              <a:t>19.08.19</a:t>
+              <a:t>20.08.19</a:t>
             </a:fld>
             <a:endParaRPr lang="fr-FR"/>
           </a:p>
@@ -6355,7 +6384,7 @@
           <a:p>
             <a:fld id="{25EBF822-9ECC-2349-B15F-99FCED650E02}" type="datetime1">
               <a:rPr lang="fr-CH" smtClean="0"/>
-              <a:t>19.08.19</a:t>
+              <a:t>20.08.19</a:t>
             </a:fld>
             <a:endParaRPr lang="fr-FR"/>
           </a:p>
@@ -6669,7 +6698,7 @@
           <a:p>
             <a:fld id="{6236C60F-AD31-4C47-A64F-BDD3E3A8FB2F}" type="datetime1">
               <a:rPr lang="fr-CH" smtClean="0"/>
-              <a:t>19.08.19</a:t>
+              <a:t>20.08.19</a:t>
             </a:fld>
             <a:endParaRPr lang="fr-FR"/>
           </a:p>
@@ -6960,7 +6989,7 @@
           <a:p>
             <a:fld id="{FCAE71BE-364E-2247-A9A5-5BA7802DF1C2}" type="datetime1">
               <a:rPr lang="fr-CH" smtClean="0"/>
-              <a:t>19.08.19</a:t>
+              <a:t>20.08.19</a:t>
             </a:fld>
             <a:endParaRPr lang="fr-FR"/>
           </a:p>
@@ -7207,7 +7236,7 @@
           <a:p>
             <a:fld id="{78E740DE-650B-074E-A1BA-A7A7F9B8B0DA}" type="datetime1">
               <a:rPr lang="fr-CH" smtClean="0"/>
-              <a:t>19.08.19</a:t>
+              <a:t>20.08.19</a:t>
             </a:fld>
             <a:endParaRPr lang="fr-FR"/>
           </a:p>
@@ -16665,7 +16694,7 @@
           <p:nvPr/>
         </p:nvPicPr>
         <p:blipFill>
-          <a:blip r:embed="rId2"/>
+          <a:blip r:embed="rId3"/>
           <a:stretch>
             <a:fillRect/>
           </a:stretch>

</xml_diff>